<commit_message>
added some more instructions related to submission to MyCourses
</commit_message>
<xml_diff>
--- a/1.1A-Activity-PSS_ Git Basics.pptx
+++ b/1.1A-Activity-PSS_ Git Basics.pptx
@@ -8299,7 +8299,7 @@
         <p:spPr>
           <a:xfrm>
             <a:off x="311700" y="1505700"/>
-            <a:ext cx="4128000" cy="3286800"/>
+            <a:ext cx="4260300" cy="3286800"/>
           </a:xfrm>
           <a:prstGeom prst="rect">
             <a:avLst/>
@@ -8483,10 +8483,25 @@
               <a:buChar char="●"/>
             </a:pPr>
             <a:r>
-              <a:rPr lang="en" dirty="0"/>
-              <a:t>Write your name on each page and submit on dropbox on MyCourses</a:t>
+              <a:rPr lang="en-US" dirty="0"/>
+              <a:t>Write your name on each completed sheet.</a:t>
             </a:r>
-            <a:endParaRPr dirty="0"/>
+          </a:p>
+          <a:p>
+            <a:pPr marL="457200" lvl="0" indent="-311150" algn="l" rtl="0">
+              <a:spcBef>
+                <a:spcPts val="0"/>
+              </a:spcBef>
+              <a:spcAft>
+                <a:spcPts val="0"/>
+              </a:spcAft>
+              <a:buSzPts val="1300"/>
+              <a:buChar char="●"/>
+            </a:pPr>
+            <a:r>
+              <a:rPr lang="en-US" dirty="0"/>
+              <a:t>Submit to the designated MyCourses’ Dropbox.</a:t>
+            </a:r>
           </a:p>
         </p:txBody>
       </p:sp>

</xml_diff>